<commit_message>
pdfed the pptx file
</commit_message>
<xml_diff>
--- a/projects/project01/rwest/Project_1_robert_west.pptx
+++ b/projects/project01/rwest/Project_1_robert_west.pptx
@@ -3210,7 +3210,7 @@
         <p:spPr>
           <a:xfrm>
             <a:off x="2105891" y="4043157"/>
-            <a:ext cx="4876800" cy="400110"/>
+            <a:ext cx="4876800" cy="2246769"/>
           </a:xfrm>
           <a:prstGeom prst="rect">
             <a:avLst/>
@@ -3232,8 +3232,91 @@
                 <a:ea typeface="+mj-ea"/>
                 <a:cs typeface="+mj-cs"/>
               </a:rPr>
-              <a:t>Without being banned for life?...</a:t>
-            </a:r>
+              <a:t>Without being banned for life</a:t>
+            </a:r>
+            <a:r>
+              <a:rPr lang="en-US" sz="2000" dirty="0" smtClean="0">
+                <a:solidFill>
+                  <a:srgbClr val="0070C0"/>
+                </a:solidFill>
+                <a:latin typeface="+mj-lt"/>
+                <a:ea typeface="+mj-ea"/>
+                <a:cs typeface="+mj-cs"/>
+              </a:rPr>
+              <a:t>?...</a:t>
+            </a:r>
+          </a:p>
+          <a:p>
+            <a:endParaRPr lang="en-US" sz="2000" dirty="0">
+              <a:solidFill>
+                <a:srgbClr val="0070C0"/>
+              </a:solidFill>
+              <a:latin typeface="+mj-lt"/>
+              <a:ea typeface="+mj-ea"/>
+              <a:cs typeface="+mj-cs"/>
+            </a:endParaRPr>
+          </a:p>
+          <a:p>
+            <a:endParaRPr lang="en-US" sz="2000" dirty="0" smtClean="0">
+              <a:solidFill>
+                <a:srgbClr val="0070C0"/>
+              </a:solidFill>
+              <a:latin typeface="+mj-lt"/>
+              <a:ea typeface="+mj-ea"/>
+              <a:cs typeface="+mj-cs"/>
+            </a:endParaRPr>
+          </a:p>
+          <a:p>
+            <a:endParaRPr lang="en-US" sz="2000" dirty="0">
+              <a:solidFill>
+                <a:srgbClr val="0070C0"/>
+              </a:solidFill>
+              <a:latin typeface="+mj-lt"/>
+              <a:ea typeface="+mj-ea"/>
+              <a:cs typeface="+mj-cs"/>
+            </a:endParaRPr>
+          </a:p>
+          <a:p>
+            <a:endParaRPr lang="en-US" sz="2000" dirty="0" smtClean="0">
+              <a:solidFill>
+                <a:srgbClr val="0070C0"/>
+              </a:solidFill>
+              <a:latin typeface="+mj-lt"/>
+              <a:ea typeface="+mj-ea"/>
+              <a:cs typeface="+mj-cs"/>
+            </a:endParaRPr>
+          </a:p>
+          <a:p>
+            <a:endParaRPr lang="en-US" sz="2000" dirty="0">
+              <a:solidFill>
+                <a:srgbClr val="0070C0"/>
+              </a:solidFill>
+              <a:latin typeface="+mj-lt"/>
+              <a:ea typeface="+mj-ea"/>
+              <a:cs typeface="+mj-cs"/>
+            </a:endParaRPr>
+          </a:p>
+          <a:p>
+            <a:pPr algn="ctr"/>
+            <a:r>
+              <a:rPr lang="en-US" sz="2000" dirty="0" smtClean="0">
+                <a:solidFill>
+                  <a:srgbClr val="0070C0"/>
+                </a:solidFill>
+                <a:latin typeface="+mj-lt"/>
+                <a:ea typeface="+mj-ea"/>
+                <a:cs typeface="+mj-cs"/>
+              </a:rPr>
+              <a:t>Robert D. West</a:t>
+            </a:r>
+            <a:endParaRPr lang="en-US" sz="2000" dirty="0">
+              <a:solidFill>
+                <a:srgbClr val="0070C0"/>
+              </a:solidFill>
+              <a:latin typeface="+mj-lt"/>
+              <a:ea typeface="+mj-ea"/>
+              <a:cs typeface="+mj-cs"/>
+            </a:endParaRPr>
           </a:p>
         </p:txBody>
       </p:sp>

</xml_diff>